<commit_message>
Update README.md and Logo + Icon + generated assets
</commit_message>
<xml_diff>
--- a/Assets/LogoAndIcon.pptx
+++ b/Assets/LogoAndIcon.pptx
@@ -5883,10 +5883,10 @@
       </p:grpSp>
       <p:grpSp>
         <p:nvGrpSpPr>
-          <p:cNvPr id="7" name="Group 6">
+          <p:cNvPr id="8" name="Group 7">
             <a:extLst>
               <a:ext uri="{FF2B5EF4-FFF2-40B4-BE49-F238E27FC236}">
-                <a16:creationId xmlns:a16="http://schemas.microsoft.com/office/drawing/2014/main" id="{41B59C31-DCDF-C94B-2AA0-046C4BB20D9A}"/>
+                <a16:creationId xmlns:a16="http://schemas.microsoft.com/office/drawing/2014/main" id="{2F99E5AF-550F-4DD7-3A24-55BC95181C2C}"/>
               </a:ext>
             </a:extLst>
           </p:cNvPr>
@@ -5895,10 +5895,10 @@
         </p:nvGrpSpPr>
         <p:grpSpPr>
           <a:xfrm>
-            <a:off x="6539900" y="2480956"/>
-            <a:ext cx="1872000" cy="1872000"/>
-            <a:chOff x="6539900" y="2480956"/>
-            <a:chExt cx="1872000" cy="1872000"/>
+            <a:off x="7088716" y="2897524"/>
+            <a:ext cx="1908000" cy="1908000"/>
+            <a:chOff x="7088716" y="2897524"/>
+            <a:chExt cx="1908000" cy="1908000"/>
           </a:xfrm>
         </p:grpSpPr>
         <p:sp>
@@ -5915,8 +5915,8 @@
           </p:nvSpPr>
           <p:spPr>
             <a:xfrm>
-              <a:off x="6539900" y="2480956"/>
-              <a:ext cx="1872000" cy="1872000"/>
+              <a:off x="7088716" y="2897524"/>
+              <a:ext cx="1908000" cy="1908000"/>
             </a:xfrm>
             <a:prstGeom prst="rect">
               <a:avLst/>
@@ -5924,6 +5924,11 @@
             <a:solidFill>
               <a:srgbClr val="1C1917"/>
             </a:solidFill>
+            <a:ln>
+              <a:solidFill>
+                <a:srgbClr val="1C1917"/>
+              </a:solidFill>
+            </a:ln>
           </p:spPr>
           <p:style>
             <a:lnRef idx="2">
@@ -5964,7 +5969,7 @@
           </p:nvSpPr>
           <p:spPr>
             <a:xfrm>
-              <a:off x="6809900" y="2750956"/>
+              <a:off x="7376716" y="3185524"/>
               <a:ext cx="1332000" cy="1332000"/>
             </a:xfrm>
             <a:prstGeom prst="bracePair">
@@ -6130,7 +6135,7 @@
             <a:lstStyle/>
             <a:p>
               <a:pPr algn="ctr"/>
-              <a:endParaRPr lang="en-US"/>
+              <a:endParaRPr lang="en-US" dirty="0"/>
             </a:p>
           </p:txBody>
         </p:sp>
@@ -8109,106 +8114,130 @@
           </p:sp>
         </p:grpSp>
       </p:grpSp>
-      <p:sp>
-        <p:nvSpPr>
-          <p:cNvPr id="77" name="Rectangle 76">
+      <p:grpSp>
+        <p:nvGrpSpPr>
+          <p:cNvPr id="7" name="Group 6">
             <a:extLst>
               <a:ext uri="{FF2B5EF4-FFF2-40B4-BE49-F238E27FC236}">
-                <a16:creationId xmlns:a16="http://schemas.microsoft.com/office/drawing/2014/main" id="{BD9A5766-45BB-BA5A-B0CD-CCF7EC934962}"/>
+                <a16:creationId xmlns:a16="http://schemas.microsoft.com/office/drawing/2014/main" id="{3C12AE57-FD93-2A57-53FE-2E05016B1975}"/>
               </a:ext>
             </a:extLst>
           </p:cNvPr>
-          <p:cNvSpPr/>
+          <p:cNvGrpSpPr/>
           <p:nvPr/>
-        </p:nvSpPr>
-        <p:spPr>
+        </p:nvGrpSpPr>
+        <p:grpSpPr>
           <a:xfrm>
             <a:off x="6539900" y="2480956"/>
             <a:ext cx="1872000" cy="1872000"/>
+            <a:chOff x="6539900" y="2480956"/>
+            <a:chExt cx="1872000" cy="1872000"/>
           </a:xfrm>
-          <a:prstGeom prst="rect">
-            <a:avLst/>
-          </a:prstGeom>
-          <a:solidFill>
-            <a:srgbClr val="292524"/>
-          </a:solidFill>
-        </p:spPr>
-        <p:style>
-          <a:lnRef idx="2">
-            <a:schemeClr val="accent1">
-              <a:shade val="50000"/>
-            </a:schemeClr>
-          </a:lnRef>
-          <a:fillRef idx="1">
-            <a:schemeClr val="accent1"/>
-          </a:fillRef>
-          <a:effectRef idx="0">
-            <a:schemeClr val="accent1"/>
-          </a:effectRef>
-          <a:fontRef idx="minor">
-            <a:schemeClr val="lt1"/>
-          </a:fontRef>
-        </p:style>
-        <p:txBody>
-          <a:bodyPr rtlCol="0" anchor="ctr"/>
-          <a:lstStyle/>
-          <a:p>
-            <a:pPr algn="ctr"/>
-            <a:endParaRPr lang="en-US"/>
-          </a:p>
-        </p:txBody>
-      </p:sp>
-      <p:sp>
-        <p:nvSpPr>
-          <p:cNvPr id="81" name="Double Brace 80">
-            <a:extLst>
-              <a:ext uri="{FF2B5EF4-FFF2-40B4-BE49-F238E27FC236}">
-                <a16:creationId xmlns:a16="http://schemas.microsoft.com/office/drawing/2014/main" id="{6218A8FD-E189-6E2E-73EC-5D79091043D7}"/>
-              </a:ext>
-            </a:extLst>
-          </p:cNvPr>
-          <p:cNvSpPr/>
-          <p:nvPr/>
-        </p:nvSpPr>
-        <p:spPr>
-          <a:xfrm>
-            <a:off x="6809900" y="2750956"/>
-            <a:ext cx="1332000" cy="1332000"/>
-          </a:xfrm>
-          <a:prstGeom prst="bracePair">
-            <a:avLst>
-              <a:gd name="adj" fmla="val 17914"/>
-            </a:avLst>
-          </a:prstGeom>
-          <a:ln w="127000">
+        </p:grpSpPr>
+        <p:sp>
+          <p:nvSpPr>
+            <p:cNvPr id="77" name="Rectangle 76">
+              <a:extLst>
+                <a:ext uri="{FF2B5EF4-FFF2-40B4-BE49-F238E27FC236}">
+                  <a16:creationId xmlns:a16="http://schemas.microsoft.com/office/drawing/2014/main" id="{BD9A5766-45BB-BA5A-B0CD-CCF7EC934962}"/>
+                </a:ext>
+              </a:extLst>
+            </p:cNvPr>
+            <p:cNvSpPr/>
+            <p:nvPr/>
+          </p:nvSpPr>
+          <p:spPr>
+            <a:xfrm>
+              <a:off x="6539900" y="2480956"/>
+              <a:ext cx="1872000" cy="1872000"/>
+            </a:xfrm>
+            <a:prstGeom prst="rect">
+              <a:avLst/>
+            </a:prstGeom>
             <a:solidFill>
-              <a:srgbClr val="E7E5E4"/>
+              <a:srgbClr val="292524"/>
             </a:solidFill>
-          </a:ln>
-        </p:spPr>
-        <p:style>
-          <a:lnRef idx="1">
-            <a:schemeClr val="accent1"/>
-          </a:lnRef>
-          <a:fillRef idx="0">
-            <a:schemeClr val="accent1"/>
-          </a:fillRef>
-          <a:effectRef idx="0">
-            <a:schemeClr val="accent1"/>
-          </a:effectRef>
-          <a:fontRef idx="minor">
-            <a:schemeClr val="tx1"/>
-          </a:fontRef>
-        </p:style>
-        <p:txBody>
-          <a:bodyPr rtlCol="0" anchor="ctr"/>
-          <a:lstStyle/>
-          <a:p>
-            <a:pPr algn="ctr"/>
-            <a:endParaRPr lang="en-US"/>
-          </a:p>
-        </p:txBody>
-      </p:sp>
+            <a:ln>
+              <a:noFill/>
+            </a:ln>
+          </p:spPr>
+          <p:style>
+            <a:lnRef idx="2">
+              <a:schemeClr val="accent1">
+                <a:shade val="50000"/>
+              </a:schemeClr>
+            </a:lnRef>
+            <a:fillRef idx="1">
+              <a:schemeClr val="accent1"/>
+            </a:fillRef>
+            <a:effectRef idx="0">
+              <a:schemeClr val="accent1"/>
+            </a:effectRef>
+            <a:fontRef idx="minor">
+              <a:schemeClr val="lt1"/>
+            </a:fontRef>
+          </p:style>
+          <p:txBody>
+            <a:bodyPr rtlCol="0" anchor="ctr"/>
+            <a:lstStyle/>
+            <a:p>
+              <a:pPr algn="ctr"/>
+              <a:endParaRPr lang="en-US"/>
+            </a:p>
+          </p:txBody>
+        </p:sp>
+        <p:sp>
+          <p:nvSpPr>
+            <p:cNvPr id="81" name="Double Brace 80">
+              <a:extLst>
+                <a:ext uri="{FF2B5EF4-FFF2-40B4-BE49-F238E27FC236}">
+                  <a16:creationId xmlns:a16="http://schemas.microsoft.com/office/drawing/2014/main" id="{6218A8FD-E189-6E2E-73EC-5D79091043D7}"/>
+                </a:ext>
+              </a:extLst>
+            </p:cNvPr>
+            <p:cNvSpPr/>
+            <p:nvPr/>
+          </p:nvSpPr>
+          <p:spPr>
+            <a:xfrm>
+              <a:off x="6809900" y="2750956"/>
+              <a:ext cx="1332000" cy="1332000"/>
+            </a:xfrm>
+            <a:prstGeom prst="bracePair">
+              <a:avLst>
+                <a:gd name="adj" fmla="val 17914"/>
+              </a:avLst>
+            </a:prstGeom>
+            <a:ln w="127000">
+              <a:solidFill>
+                <a:srgbClr val="E7E5E4"/>
+              </a:solidFill>
+            </a:ln>
+          </p:spPr>
+          <p:style>
+            <a:lnRef idx="1">
+              <a:schemeClr val="accent1"/>
+            </a:lnRef>
+            <a:fillRef idx="0">
+              <a:schemeClr val="accent1"/>
+            </a:fillRef>
+            <a:effectRef idx="0">
+              <a:schemeClr val="accent1"/>
+            </a:effectRef>
+            <a:fontRef idx="minor">
+              <a:schemeClr val="tx1"/>
+            </a:fontRef>
+          </p:style>
+          <p:txBody>
+            <a:bodyPr rtlCol="0" anchor="ctr"/>
+            <a:lstStyle/>
+            <a:p>
+              <a:pPr algn="ctr"/>
+              <a:endParaRPr lang="en-US"/>
+            </a:p>
+          </p:txBody>
+        </p:sp>
+      </p:grpSp>
       <p:sp>
         <p:nvSpPr>
           <p:cNvPr id="3" name="Title 2">

</xml_diff>